<commit_message>
add git commands to misc
</commit_message>
<xml_diff>
--- a/misc.pptx
+++ b/misc.pptx
@@ -292,7 +292,7 @@
             <a:fld id="{D402BF7D-F251-43C7-97BB-91CE6774D293}" type="datetimeFigureOut">
               <a:rPr lang="en-IN" smtClean="0"/>
               <a:pPr/>
-              <a:t>18-04-2020</a:t>
+              <a:t>21-04-2020</a:t>
             </a:fld>
             <a:endParaRPr lang="en-IN"/>
           </a:p>
@@ -459,7 +459,7 @@
             <a:fld id="{D402BF7D-F251-43C7-97BB-91CE6774D293}" type="datetimeFigureOut">
               <a:rPr lang="en-IN" smtClean="0"/>
               <a:pPr/>
-              <a:t>18-04-2020</a:t>
+              <a:t>21-04-2020</a:t>
             </a:fld>
             <a:endParaRPr lang="en-IN"/>
           </a:p>
@@ -636,7 +636,7 @@
             <a:fld id="{D402BF7D-F251-43C7-97BB-91CE6774D293}" type="datetimeFigureOut">
               <a:rPr lang="en-IN" smtClean="0"/>
               <a:pPr/>
-              <a:t>18-04-2020</a:t>
+              <a:t>21-04-2020</a:t>
             </a:fld>
             <a:endParaRPr lang="en-IN"/>
           </a:p>
@@ -803,7 +803,7 @@
             <a:fld id="{D402BF7D-F251-43C7-97BB-91CE6774D293}" type="datetimeFigureOut">
               <a:rPr lang="en-IN" smtClean="0"/>
               <a:pPr/>
-              <a:t>18-04-2020</a:t>
+              <a:t>21-04-2020</a:t>
             </a:fld>
             <a:endParaRPr lang="en-IN"/>
           </a:p>
@@ -1046,7 +1046,7 @@
             <a:fld id="{D402BF7D-F251-43C7-97BB-91CE6774D293}" type="datetimeFigureOut">
               <a:rPr lang="en-IN" smtClean="0"/>
               <a:pPr/>
-              <a:t>18-04-2020</a:t>
+              <a:t>21-04-2020</a:t>
             </a:fld>
             <a:endParaRPr lang="en-IN"/>
           </a:p>
@@ -1331,7 +1331,7 @@
             <a:fld id="{D402BF7D-F251-43C7-97BB-91CE6774D293}" type="datetimeFigureOut">
               <a:rPr lang="en-IN" smtClean="0"/>
               <a:pPr/>
-              <a:t>18-04-2020</a:t>
+              <a:t>21-04-2020</a:t>
             </a:fld>
             <a:endParaRPr lang="en-IN"/>
           </a:p>
@@ -1750,7 +1750,7 @@
             <a:fld id="{D402BF7D-F251-43C7-97BB-91CE6774D293}" type="datetimeFigureOut">
               <a:rPr lang="en-IN" smtClean="0"/>
               <a:pPr/>
-              <a:t>18-04-2020</a:t>
+              <a:t>21-04-2020</a:t>
             </a:fld>
             <a:endParaRPr lang="en-IN"/>
           </a:p>
@@ -1865,7 +1865,7 @@
             <a:fld id="{D402BF7D-F251-43C7-97BB-91CE6774D293}" type="datetimeFigureOut">
               <a:rPr lang="en-IN" smtClean="0"/>
               <a:pPr/>
-              <a:t>18-04-2020</a:t>
+              <a:t>21-04-2020</a:t>
             </a:fld>
             <a:endParaRPr lang="en-IN"/>
           </a:p>
@@ -1957,7 +1957,7 @@
             <a:fld id="{D402BF7D-F251-43C7-97BB-91CE6774D293}" type="datetimeFigureOut">
               <a:rPr lang="en-IN" smtClean="0"/>
               <a:pPr/>
-              <a:t>18-04-2020</a:t>
+              <a:t>21-04-2020</a:t>
             </a:fld>
             <a:endParaRPr lang="en-IN"/>
           </a:p>
@@ -2231,7 +2231,7 @@
             <a:fld id="{D402BF7D-F251-43C7-97BB-91CE6774D293}" type="datetimeFigureOut">
               <a:rPr lang="en-IN" smtClean="0"/>
               <a:pPr/>
-              <a:t>18-04-2020</a:t>
+              <a:t>21-04-2020</a:t>
             </a:fld>
             <a:endParaRPr lang="en-IN"/>
           </a:p>
@@ -2481,7 +2481,7 @@
             <a:fld id="{D402BF7D-F251-43C7-97BB-91CE6774D293}" type="datetimeFigureOut">
               <a:rPr lang="en-IN" smtClean="0"/>
               <a:pPr/>
-              <a:t>18-04-2020</a:t>
+              <a:t>21-04-2020</a:t>
             </a:fld>
             <a:endParaRPr lang="en-IN"/>
           </a:p>
@@ -2691,7 +2691,7 @@
             <a:fld id="{D402BF7D-F251-43C7-97BB-91CE6774D293}" type="datetimeFigureOut">
               <a:rPr lang="en-IN" smtClean="0"/>
               <a:pPr/>
-              <a:t>18-04-2020</a:t>
+              <a:t>21-04-2020</a:t>
             </a:fld>
             <a:endParaRPr lang="en-IN"/>
           </a:p>
@@ -3711,9 +3711,54 @@
           </a:p>
           <a:p>
             <a:r>
+              <a:rPr lang="en-IN" dirty="0" smtClean="0"/>
+              <a:t>git remote </a:t>
+            </a:r>
+            <a:r>
+              <a:rPr lang="en-IN" dirty="0" smtClean="0"/>
+              <a:t>–v</a:t>
+            </a:r>
+          </a:p>
+          <a:p>
+            <a:r>
+              <a:rPr lang="en-IN" dirty="0" smtClean="0"/>
+              <a:t>git clone &lt;git repo </a:t>
+            </a:r>
+            <a:r>
+              <a:rPr lang="en-IN" dirty="0" err="1" smtClean="0"/>
+              <a:t>url</a:t>
+            </a:r>
+            <a:r>
+              <a:rPr lang="en-IN" dirty="0" smtClean="0"/>
+              <a:t>&gt;</a:t>
+            </a:r>
+          </a:p>
+          <a:p>
+            <a:r>
+              <a:rPr lang="en-IN" dirty="0" smtClean="0"/>
+              <a:t>git add &lt;file names&gt; (or) git add .</a:t>
+            </a:r>
+          </a:p>
+          <a:p>
+            <a:r>
+              <a:rPr lang="en-IN" dirty="0" smtClean="0"/>
+              <a:t>git commit -m “commit message”</a:t>
+            </a:r>
+          </a:p>
+          <a:p>
+            <a:r>
+              <a:rPr lang="en-IN" dirty="0" smtClean="0"/>
+              <a:t>git </a:t>
+            </a:r>
+            <a:r>
               <a:rPr lang="en-IN" smtClean="0"/>
-              <a:t>git remote -v</a:t>
-            </a:r>
+              <a:t>push origin master</a:t>
+            </a:r>
+          </a:p>
+          <a:p>
+            <a:endParaRPr lang="en-IN" dirty="0" smtClean="0"/>
+          </a:p>
+          <a:p>
             <a:endParaRPr lang="en-IN" dirty="0"/>
           </a:p>
         </p:txBody>

</xml_diff>